<commit_message>
Checking in the raw file.
</commit_message>
<xml_diff>
--- a/flash/PipeJam3/lib/assets/splash/GameHelpRaw.pptx
+++ b/flash/PipeJam3/lib/assets/splash/GameHelpRaw.pptx
@@ -104,6 +104,11 @@
       </a:defRPr>
     </a:lvl9pPr>
   </p:defaultTextStyle>
+  <p:extLst>
+    <p:ext uri="{EFAFB233-063F-42B5-8137-9DF3F51BA10A}">
+      <p15:sldGuideLst xmlns:p15="http://schemas.microsoft.com/office/powerpoint/2012/main"/>
+    </p:ext>
+  </p:extLst>
 </p:presentation>
 </file>
 
@@ -152,7 +157,6 @@
               <a:rPr lang="en-US"/>
               <a:t>Click to edit Master title style</a:t>
             </a:r>
-            <a:endParaRPr lang="en-US"/>
           </a:p>
         </p:txBody>
       </p:sp>
@@ -217,7 +221,6 @@
               <a:rPr lang="en-US"/>
               <a:t>Click to edit Master subtitle style</a:t>
             </a:r>
-            <a:endParaRPr lang="en-US"/>
           </a:p>
         </p:txBody>
       </p:sp>
@@ -238,7 +241,7 @@
           <a:p>
             <a:fld id="{6DFC212B-B5F1-4ED3-8C1E-5E57B7D09905}" type="datetimeFigureOut">
               <a:rPr lang="en-US" smtClean="0"/>
-              <a:t>11/12/2016</a:t>
+              <a:t>11/13/2016</a:t>
             </a:fld>
             <a:endParaRPr lang="en-US"/>
           </a:p>
@@ -335,7 +338,6 @@
               <a:rPr lang="en-US"/>
               <a:t>Click to edit Master title style</a:t>
             </a:r>
-            <a:endParaRPr lang="en-US"/>
           </a:p>
         </p:txBody>
       </p:sp>
@@ -387,7 +389,6 @@
               <a:rPr lang="en-US"/>
               <a:t>Fifth level</a:t>
             </a:r>
-            <a:endParaRPr lang="en-US"/>
           </a:p>
         </p:txBody>
       </p:sp>
@@ -408,7 +409,7 @@
           <a:p>
             <a:fld id="{6DFC212B-B5F1-4ED3-8C1E-5E57B7D09905}" type="datetimeFigureOut">
               <a:rPr lang="en-US" smtClean="0"/>
-              <a:t>11/12/2016</a:t>
+              <a:t>11/13/2016</a:t>
             </a:fld>
             <a:endParaRPr lang="en-US"/>
           </a:p>
@@ -510,7 +511,6 @@
               <a:rPr lang="en-US"/>
               <a:t>Click to edit Master title style</a:t>
             </a:r>
-            <a:endParaRPr lang="en-US"/>
           </a:p>
         </p:txBody>
       </p:sp>
@@ -567,7 +567,6 @@
               <a:rPr lang="en-US"/>
               <a:t>Fifth level</a:t>
             </a:r>
-            <a:endParaRPr lang="en-US"/>
           </a:p>
         </p:txBody>
       </p:sp>
@@ -588,7 +587,7 @@
           <a:p>
             <a:fld id="{6DFC212B-B5F1-4ED3-8C1E-5E57B7D09905}" type="datetimeFigureOut">
               <a:rPr lang="en-US" smtClean="0"/>
-              <a:t>11/12/2016</a:t>
+              <a:t>11/13/2016</a:t>
             </a:fld>
             <a:endParaRPr lang="en-US"/>
           </a:p>
@@ -685,7 +684,6 @@
               <a:rPr lang="en-US"/>
               <a:t>Click to edit Master title style</a:t>
             </a:r>
-            <a:endParaRPr lang="en-US"/>
           </a:p>
         </p:txBody>
       </p:sp>
@@ -737,7 +735,6 @@
               <a:rPr lang="en-US"/>
               <a:t>Fifth level</a:t>
             </a:r>
-            <a:endParaRPr lang="en-US"/>
           </a:p>
         </p:txBody>
       </p:sp>
@@ -758,7 +755,7 @@
           <a:p>
             <a:fld id="{6DFC212B-B5F1-4ED3-8C1E-5E57B7D09905}" type="datetimeFigureOut">
               <a:rPr lang="en-US" smtClean="0"/>
-              <a:t>11/12/2016</a:t>
+              <a:t>11/13/2016</a:t>
             </a:fld>
             <a:endParaRPr lang="en-US"/>
           </a:p>
@@ -864,7 +861,6 @@
               <a:rPr lang="en-US"/>
               <a:t>Click to edit Master title style</a:t>
             </a:r>
-            <a:endParaRPr lang="en-US"/>
           </a:p>
         </p:txBody>
       </p:sp>
@@ -1004,7 +1000,7 @@
           <a:p>
             <a:fld id="{6DFC212B-B5F1-4ED3-8C1E-5E57B7D09905}" type="datetimeFigureOut">
               <a:rPr lang="en-US" smtClean="0"/>
-              <a:t>11/12/2016</a:t>
+              <a:t>11/13/2016</a:t>
             </a:fld>
             <a:endParaRPr lang="en-US"/>
           </a:p>
@@ -1101,7 +1097,6 @@
               <a:rPr lang="en-US"/>
               <a:t>Click to edit Master title style</a:t>
             </a:r>
-            <a:endParaRPr lang="en-US"/>
           </a:p>
         </p:txBody>
       </p:sp>
@@ -1158,7 +1153,6 @@
               <a:rPr lang="en-US"/>
               <a:t>Fifth level</a:t>
             </a:r>
-            <a:endParaRPr lang="en-US"/>
           </a:p>
         </p:txBody>
       </p:sp>
@@ -1215,7 +1209,6 @@
               <a:rPr lang="en-US"/>
               <a:t>Fifth level</a:t>
             </a:r>
-            <a:endParaRPr lang="en-US"/>
           </a:p>
         </p:txBody>
       </p:sp>
@@ -1236,7 +1229,7 @@
           <a:p>
             <a:fld id="{6DFC212B-B5F1-4ED3-8C1E-5E57B7D09905}" type="datetimeFigureOut">
               <a:rPr lang="en-US" smtClean="0"/>
-              <a:t>11/12/2016</a:t>
+              <a:t>11/13/2016</a:t>
             </a:fld>
             <a:endParaRPr lang="en-US"/>
           </a:p>
@@ -1338,7 +1331,6 @@
               <a:rPr lang="en-US"/>
               <a:t>Click to edit Master title style</a:t>
             </a:r>
-            <a:endParaRPr lang="en-US"/>
           </a:p>
         </p:txBody>
       </p:sp>
@@ -1460,7 +1452,6 @@
               <a:rPr lang="en-US"/>
               <a:t>Fifth level</a:t>
             </a:r>
-            <a:endParaRPr lang="en-US"/>
           </a:p>
         </p:txBody>
       </p:sp>
@@ -1582,7 +1573,6 @@
               <a:rPr lang="en-US"/>
               <a:t>Fifth level</a:t>
             </a:r>
-            <a:endParaRPr lang="en-US"/>
           </a:p>
         </p:txBody>
       </p:sp>
@@ -1603,7 +1593,7 @@
           <a:p>
             <a:fld id="{6DFC212B-B5F1-4ED3-8C1E-5E57B7D09905}" type="datetimeFigureOut">
               <a:rPr lang="en-US" smtClean="0"/>
-              <a:t>11/12/2016</a:t>
+              <a:t>11/13/2016</a:t>
             </a:fld>
             <a:endParaRPr lang="en-US"/>
           </a:p>
@@ -1700,7 +1690,6 @@
               <a:rPr lang="en-US"/>
               <a:t>Click to edit Master title style</a:t>
             </a:r>
-            <a:endParaRPr lang="en-US"/>
           </a:p>
         </p:txBody>
       </p:sp>
@@ -1721,7 +1710,7 @@
           <a:p>
             <a:fld id="{6DFC212B-B5F1-4ED3-8C1E-5E57B7D09905}" type="datetimeFigureOut">
               <a:rPr lang="en-US" smtClean="0"/>
-              <a:t>11/12/2016</a:t>
+              <a:t>11/13/2016</a:t>
             </a:fld>
             <a:endParaRPr lang="en-US"/>
           </a:p>
@@ -1816,7 +1805,7 @@
           <a:p>
             <a:fld id="{6DFC212B-B5F1-4ED3-8C1E-5E57B7D09905}" type="datetimeFigureOut">
               <a:rPr lang="en-US" smtClean="0"/>
-              <a:t>11/12/2016</a:t>
+              <a:t>11/13/2016</a:t>
             </a:fld>
             <a:endParaRPr lang="en-US"/>
           </a:p>
@@ -1922,7 +1911,6 @@
               <a:rPr lang="en-US"/>
               <a:t>Click to edit Master title style</a:t>
             </a:r>
-            <a:endParaRPr lang="en-US"/>
           </a:p>
         </p:txBody>
       </p:sp>
@@ -2007,7 +1995,6 @@
               <a:rPr lang="en-US"/>
               <a:t>Fifth level</a:t>
             </a:r>
-            <a:endParaRPr lang="en-US"/>
           </a:p>
         </p:txBody>
       </p:sp>
@@ -2093,7 +2080,7 @@
           <a:p>
             <a:fld id="{6DFC212B-B5F1-4ED3-8C1E-5E57B7D09905}" type="datetimeFigureOut">
               <a:rPr lang="en-US" smtClean="0"/>
-              <a:t>11/12/2016</a:t>
+              <a:t>11/13/2016</a:t>
             </a:fld>
             <a:endParaRPr lang="en-US"/>
           </a:p>
@@ -2199,7 +2186,6 @@
               <a:rPr lang="en-US"/>
               <a:t>Click to edit Master title style</a:t>
             </a:r>
-            <a:endParaRPr lang="en-US"/>
           </a:p>
         </p:txBody>
       </p:sp>
@@ -2346,7 +2332,7 @@
           <a:p>
             <a:fld id="{6DFC212B-B5F1-4ED3-8C1E-5E57B7D09905}" type="datetimeFigureOut">
               <a:rPr lang="en-US" smtClean="0"/>
-              <a:t>11/12/2016</a:t>
+              <a:t>11/13/2016</a:t>
             </a:fld>
             <a:endParaRPr lang="en-US"/>
           </a:p>
@@ -2458,7 +2444,6 @@
               <a:rPr lang="en-US"/>
               <a:t>Click to edit Master title style</a:t>
             </a:r>
-            <a:endParaRPr lang="en-US"/>
           </a:p>
         </p:txBody>
       </p:sp>
@@ -2520,7 +2505,6 @@
               <a:rPr lang="en-US"/>
               <a:t>Fifth level</a:t>
             </a:r>
-            <a:endParaRPr lang="en-US"/>
           </a:p>
         </p:txBody>
       </p:sp>
@@ -2559,7 +2543,7 @@
           <a:p>
             <a:fld id="{6DFC212B-B5F1-4ED3-8C1E-5E57B7D09905}" type="datetimeFigureOut">
               <a:rPr lang="en-US" smtClean="0"/>
-              <a:t>11/12/2016</a:t>
+              <a:t>11/13/2016</a:t>
             </a:fld>
             <a:endParaRPr lang="en-US"/>
           </a:p>
@@ -3212,8 +3196,17 @@
               <a:rPr lang="en-US" dirty="0">
                 <a:latin typeface="Comic Sans MS" panose="030F0702030302020204" pitchFamily="66" charset="0"/>
               </a:rPr>
-              <a:t> in computational theory.</a:t>
-            </a:r>
+              <a:t> in computational </a:t>
+            </a:r>
+            <a:r>
+              <a:rPr lang="en-US">
+                <a:latin typeface="Comic Sans MS" panose="030F0702030302020204" pitchFamily="66" charset="0"/>
+              </a:rPr>
+              <a:t>theory. </a:t>
+            </a:r>
+            <a:endParaRPr lang="en-US" dirty="0">
+              <a:latin typeface="Comic Sans MS" panose="030F0702030302020204" pitchFamily="66" charset="0"/>
+            </a:endParaRPr>
           </a:p>
           <a:p>
             <a:pPr marL="342900" indent="-342900" algn="l">

</xml_diff>

<commit_message>
Added a small arrow pointing to the ? button when the first time the Help screen is opened.
</commit_message>
<xml_diff>
--- a/flash/PipeJam3/lib/assets/splash/GameHelpRaw.pptx
+++ b/flash/PipeJam3/lib/assets/splash/GameHelpRaw.pptx
@@ -6,6 +6,7 @@
   </p:sldMasterIdLst>
   <p:sldIdLst>
     <p:sldId id="256" r:id="rId2"/>
+    <p:sldId id="257" r:id="rId3"/>
   </p:sldIdLst>
   <p:sldSz cx="12192000" cy="6858000"/>
   <p:notesSz cx="6858000" cy="9144000"/>
@@ -3690,6 +3691,144 @@
 </p:sld>
 </file>
 
+<file path=ppt/slides/slide2.xml><?xml version="1.0" encoding="utf-8"?>
+<p:sld xmlns:a="http://schemas.openxmlformats.org/drawingml/2006/main" xmlns:r="http://schemas.openxmlformats.org/officeDocument/2006/relationships" xmlns:p="http://schemas.openxmlformats.org/presentationml/2006/main">
+  <p:cSld>
+    <p:spTree>
+      <p:nvGrpSpPr>
+        <p:cNvPr id="1" name=""/>
+        <p:cNvGrpSpPr/>
+        <p:nvPr/>
+      </p:nvGrpSpPr>
+      <p:grpSpPr>
+        <a:xfrm>
+          <a:off x="0" y="0"/>
+          <a:ext cx="0" cy="0"/>
+          <a:chOff x="0" y="0"/>
+          <a:chExt cx="0" cy="0"/>
+        </a:xfrm>
+      </p:grpSpPr>
+      <p:pic>
+        <p:nvPicPr>
+          <p:cNvPr id="4" name="Picture 3"/>
+          <p:cNvPicPr>
+            <a:picLocks noChangeAspect="1"/>
+          </p:cNvPicPr>
+          <p:nvPr/>
+        </p:nvPicPr>
+        <p:blipFill>
+          <a:blip r:embed="rId2">
+            <a:extLst>
+              <a:ext uri="{28A0092B-C50C-407E-A947-70E740481C1C}">
+                <a14:useLocalDpi xmlns:a14="http://schemas.microsoft.com/office/drawing/2010/main" val="0"/>
+              </a:ext>
+            </a:extLst>
+          </a:blip>
+          <a:stretch>
+            <a:fillRect/>
+          </a:stretch>
+        </p:blipFill>
+        <p:spPr>
+          <a:xfrm>
+            <a:off x="40511" y="69448"/>
+            <a:ext cx="12101332" cy="6603357"/>
+          </a:xfrm>
+          <a:prstGeom prst="rect">
+            <a:avLst/>
+          </a:prstGeom>
+          <a:solidFill>
+            <a:srgbClr val="FFFFFF">
+              <a:shade val="85000"/>
+            </a:srgbClr>
+          </a:solidFill>
+          <a:ln w="88900" cap="sq">
+            <a:solidFill>
+              <a:srgbClr val="FFFFFF"/>
+            </a:solidFill>
+            <a:miter lim="800000"/>
+          </a:ln>
+          <a:effectLst>
+            <a:outerShdw blurRad="55000" dist="18000" dir="5400000" algn="tl" rotWithShape="0">
+              <a:srgbClr val="000000">
+                <a:alpha val="40000"/>
+              </a:srgbClr>
+            </a:outerShdw>
+          </a:effectLst>
+          <a:scene3d>
+            <a:camera prst="orthographicFront"/>
+            <a:lightRig rig="twoPt" dir="t">
+              <a:rot lat="0" lon="0" rev="7200000"/>
+            </a:lightRig>
+          </a:scene3d>
+          <a:sp3d>
+            <a:bevelT w="25400" h="19050"/>
+            <a:contourClr>
+              <a:srgbClr val="FFFFFF"/>
+            </a:contourClr>
+          </a:sp3d>
+        </p:spPr>
+      </p:pic>
+      <p:sp>
+        <p:nvSpPr>
+          <p:cNvPr id="5" name="Right Arrow 4"/>
+          <p:cNvSpPr/>
+          <p:nvPr/>
+        </p:nvSpPr>
+        <p:spPr>
+          <a:xfrm>
+            <a:off x="130066" y="2270234"/>
+            <a:ext cx="11902965" cy="3196459"/>
+          </a:xfrm>
+          <a:prstGeom prst="rightArrow">
+            <a:avLst/>
+          </a:prstGeom>
+        </p:spPr>
+        <p:style>
+          <a:lnRef idx="2">
+            <a:schemeClr val="accent2">
+              <a:shade val="50000"/>
+            </a:schemeClr>
+          </a:lnRef>
+          <a:fillRef idx="1">
+            <a:schemeClr val="accent2"/>
+          </a:fillRef>
+          <a:effectRef idx="0">
+            <a:schemeClr val="accent2"/>
+          </a:effectRef>
+          <a:fontRef idx="minor">
+            <a:schemeClr val="lt1"/>
+          </a:fontRef>
+        </p:style>
+        <p:txBody>
+          <a:bodyPr rtlCol="0" anchor="ctr"/>
+          <a:lstStyle/>
+          <a:p>
+            <a:pPr algn="ctr"/>
+            <a:r>
+              <a:rPr lang="en-US" sz="3600" dirty="0">
+                <a:solidFill>
+                  <a:sysClr val="windowText" lastClr="000000"/>
+                </a:solidFill>
+                <a:latin typeface="Comic Sans MS" panose="030F0702030302020204" pitchFamily="66" charset="0"/>
+              </a:rPr>
+              <a:t>Click this button to see the help screen again!</a:t>
+            </a:r>
+          </a:p>
+        </p:txBody>
+      </p:sp>
+    </p:spTree>
+    <p:extLst>
+      <p:ext uri="{BB962C8B-B14F-4D97-AF65-F5344CB8AC3E}">
+        <p14:creationId xmlns:p14="http://schemas.microsoft.com/office/powerpoint/2010/main" val="3911000130"/>
+      </p:ext>
+    </p:extLst>
+  </p:cSld>
+  <p:clrMapOvr>
+    <a:masterClrMapping/>
+  </p:clrMapOvr>
+</p:sld>
+</file>
+
 <file path=ppt/theme/theme1.xml><?xml version="1.0" encoding="utf-8"?>
 <a:theme xmlns:a="http://schemas.openxmlformats.org/drawingml/2006/main" name="Office Theme">
   <a:themeElements>

</xml_diff>